<commit_message>
Final update to presentation.
</commit_message>
<xml_diff>
--- a/Documents/Presentation.pptx
+++ b/Documents/Presentation.pptx
@@ -536,6 +536,29 @@
             </a:r>
           </a:p>
           <a:p>
+            <a:r>
+              <a:rPr lang="en-US" dirty="0" smtClean="0"/>
+              <a:t>	Log in as Facebook</a:t>
+            </a:r>
+          </a:p>
+          <a:p>
+            <a:r>
+              <a:rPr lang="en-US" dirty="0" smtClean="0"/>
+              <a:t>	Add </a:t>
+            </a:r>
+            <a:r>
+              <a:rPr lang="en-US" dirty="0" smtClean="0"/>
+              <a:t>course *</a:t>
+            </a:r>
+            <a:endParaRPr lang="en-US" dirty="0" smtClean="0"/>
+          </a:p>
+          <a:p>
+            <a:r>
+              <a:rPr lang="en-US" dirty="0" smtClean="0"/>
+              <a:t>	Add course with a pre-requisite</a:t>
+            </a:r>
+          </a:p>
+          <a:p>
             <a:endParaRPr lang="en-US" dirty="0" smtClean="0"/>
           </a:p>
           <a:p>
@@ -545,12 +568,57 @@
             </a:r>
           </a:p>
           <a:p>
+            <a:r>
+              <a:rPr lang="en-US" dirty="0" smtClean="0"/>
+              <a:t>	Standard</a:t>
+            </a:r>
+            <a:r>
+              <a:rPr lang="en-US" baseline="0" dirty="0" smtClean="0"/>
+              <a:t> login at same time as student</a:t>
+            </a:r>
+          </a:p>
+          <a:p>
+            <a:r>
+              <a:rPr lang="en-US" baseline="0" dirty="0" smtClean="0"/>
+              <a:t>	See student’s </a:t>
+            </a:r>
+            <a:r>
+              <a:rPr lang="en-US" i="1" baseline="0" dirty="0" smtClean="0"/>
+              <a:t>partial </a:t>
+            </a:r>
+            <a:r>
+              <a:rPr lang="en-US" baseline="0" dirty="0" smtClean="0"/>
+              <a:t>update (AJAX</a:t>
+            </a:r>
+            <a:r>
+              <a:rPr lang="en-US" baseline="0" dirty="0" smtClean="0"/>
+              <a:t>) *</a:t>
+            </a:r>
+            <a:endParaRPr lang="en-US" dirty="0" smtClean="0"/>
+          </a:p>
+          <a:p>
             <a:endParaRPr lang="en-US" dirty="0" smtClean="0"/>
           </a:p>
           <a:p>
             <a:r>
               <a:rPr lang="en-US" dirty="0" smtClean="0"/>
               <a:t>Admin</a:t>
+            </a:r>
+          </a:p>
+          <a:p>
+            <a:r>
+              <a:rPr lang="en-US" dirty="0" smtClean="0"/>
+              <a:t>	Log in</a:t>
+            </a:r>
+          </a:p>
+          <a:p>
+            <a:r>
+              <a:rPr lang="en-US" dirty="0" smtClean="0"/>
+              <a:t>	edit</a:t>
+            </a:r>
+            <a:r>
+              <a:rPr lang="en-US" baseline="0" dirty="0" smtClean="0"/>
+              <a:t> all values</a:t>
             </a:r>
             <a:endParaRPr lang="en-US" dirty="0"/>
           </a:p>
@@ -583,6 +651,112 @@
     <p:extLst>
       <p:ext uri="{BB962C8B-B14F-4D97-AF65-F5344CB8AC3E}">
         <p14:creationId xmlns:p14="http://schemas.microsoft.com/office/powerpoint/2010/main" val="1162741827"/>
+      </p:ext>
+    </p:extLst>
+  </p:cSld>
+  <p:clrMapOvr>
+    <a:masterClrMapping/>
+  </p:clrMapOvr>
+</p:notes>
+</file>
+
+<file path=ppt/notesSlides/notesSlide2.xml><?xml version="1.0" encoding="utf-8"?>
+<p:notes xmlns:a="http://schemas.openxmlformats.org/drawingml/2006/main" xmlns:r="http://schemas.openxmlformats.org/officeDocument/2006/relationships" xmlns:p="http://schemas.openxmlformats.org/presentationml/2006/main">
+  <p:cSld>
+    <p:spTree>
+      <p:nvGrpSpPr>
+        <p:cNvPr id="1" name=""/>
+        <p:cNvGrpSpPr/>
+        <p:nvPr/>
+      </p:nvGrpSpPr>
+      <p:grpSpPr>
+        <a:xfrm>
+          <a:off x="0" y="0"/>
+          <a:ext cx="0" cy="0"/>
+          <a:chOff x="0" y="0"/>
+          <a:chExt cx="0" cy="0"/>
+        </a:xfrm>
+      </p:grpSpPr>
+      <p:sp>
+        <p:nvSpPr>
+          <p:cNvPr id="2" name="Slide Image Placeholder 1"/>
+          <p:cNvSpPr>
+            <a:spLocks noGrp="1" noRot="1" noChangeAspect="1"/>
+          </p:cNvSpPr>
+          <p:nvPr>
+            <p:ph type="sldImg"/>
+          </p:nvPr>
+        </p:nvSpPr>
+        <p:spPr/>
+      </p:sp>
+      <p:sp>
+        <p:nvSpPr>
+          <p:cNvPr id="3" name="Notes Placeholder 2"/>
+          <p:cNvSpPr>
+            <a:spLocks noGrp="1"/>
+          </p:cNvSpPr>
+          <p:nvPr>
+            <p:ph type="body" idx="1"/>
+          </p:nvPr>
+        </p:nvSpPr>
+        <p:spPr/>
+        <p:txBody>
+          <a:bodyPr/>
+          <a:lstStyle/>
+          <a:p>
+            <a:pPr marL="171450" indent="-171450">
+              <a:buFont typeface="Arial" panose="020B0604020202020204" pitchFamily="34" charset="0"/>
+              <a:buChar char="•"/>
+            </a:pPr>
+            <a:r>
+              <a:rPr lang="en-US" dirty="0" smtClean="0"/>
+              <a:t>Which stories we did not complete</a:t>
+            </a:r>
+          </a:p>
+          <a:p>
+            <a:pPr marL="171450" indent="-171450">
+              <a:buFont typeface="Arial" panose="020B0604020202020204" pitchFamily="34" charset="0"/>
+              <a:buChar char="•"/>
+            </a:pPr>
+            <a:r>
+              <a:rPr lang="en-US" dirty="0" smtClean="0"/>
+              <a:t>How many new stories did we add? - </a:t>
+            </a:r>
+            <a:r>
+              <a:rPr lang="en-US" smtClean="0"/>
+              <a:t>CanCan</a:t>
+            </a:r>
+            <a:endParaRPr lang="en-US" dirty="0"/>
+          </a:p>
+        </p:txBody>
+      </p:sp>
+      <p:sp>
+        <p:nvSpPr>
+          <p:cNvPr id="4" name="Slide Number Placeholder 3"/>
+          <p:cNvSpPr>
+            <a:spLocks noGrp="1"/>
+          </p:cNvSpPr>
+          <p:nvPr>
+            <p:ph type="sldNum" sz="quarter" idx="10"/>
+          </p:nvPr>
+        </p:nvSpPr>
+        <p:spPr/>
+        <p:txBody>
+          <a:bodyPr/>
+          <a:lstStyle/>
+          <a:p>
+            <a:fld id="{E5F7F355-DF31-44BD-ACE7-02B125FE48B2}" type="slidenum">
+              <a:rPr lang="en-US" smtClean="0"/>
+              <a:t>11</a:t>
+            </a:fld>
+            <a:endParaRPr lang="en-US"/>
+          </a:p>
+        </p:txBody>
+      </p:sp>
+    </p:spTree>
+    <p:extLst>
+      <p:ext uri="{BB962C8B-B14F-4D97-AF65-F5344CB8AC3E}">
+        <p14:creationId xmlns:p14="http://schemas.microsoft.com/office/powerpoint/2010/main" val="1520417990"/>
       </p:ext>
     </p:extLst>
   </p:cSld>
@@ -4855,15 +5029,7 @@
             <a:pPr lvl="1"/>
             <a:r>
               <a:rPr lang="en-US" sz="2000" dirty="0" smtClean="0"/>
-              <a:t>Gems </a:t>
-            </a:r>
-            <a:r>
-              <a:rPr lang="en-US" sz="2000" dirty="0" smtClean="0"/>
-              <a:t>don’t always make things easier – particularly simple </a:t>
-            </a:r>
-            <a:r>
-              <a:rPr lang="en-US" sz="2000" dirty="0" smtClean="0"/>
-              <a:t>functionality</a:t>
+              <a:t>Gems don’t always make things easier – particularly simple functionality</a:t>
             </a:r>
           </a:p>
           <a:p>
@@ -6816,15 +6982,7 @@
             </a:pPr>
             <a:r>
               <a:rPr lang="en-US" sz="2100" dirty="0" smtClean="0"/>
-              <a:t>Edits </a:t>
-            </a:r>
-            <a:r>
-              <a:rPr lang="en-US" sz="2100" dirty="0" smtClean="0"/>
-              <a:t>his/her </a:t>
-            </a:r>
-            <a:r>
-              <a:rPr lang="en-US" sz="2100" dirty="0" smtClean="0"/>
-              <a:t>information</a:t>
+              <a:t>Edits his/her information</a:t>
             </a:r>
           </a:p>
           <a:p>
@@ -6848,15 +7006,7 @@
             </a:pPr>
             <a:r>
               <a:rPr lang="en-US" sz="2100" dirty="0" smtClean="0"/>
-              <a:t>Adds </a:t>
-            </a:r>
-            <a:r>
-              <a:rPr lang="en-US" sz="2100" dirty="0" smtClean="0"/>
-              <a:t>course </a:t>
-            </a:r>
-            <a:r>
-              <a:rPr lang="en-US" sz="2100" dirty="0" smtClean="0"/>
-              <a:t>to schedule</a:t>
+              <a:t>Adds course to schedule</a:t>
             </a:r>
           </a:p>
           <a:p>
@@ -7187,19 +7337,7 @@
             </a:pPr>
             <a:r>
               <a:rPr lang="en-US" sz="2100" dirty="0" smtClean="0"/>
-              <a:t>Edit </a:t>
-            </a:r>
-            <a:r>
-              <a:rPr lang="en-US" sz="2100" dirty="0" smtClean="0"/>
-              <a:t>all</a:t>
-            </a:r>
-            <a:r>
-              <a:rPr lang="en-US" sz="2100" dirty="0" smtClean="0"/>
-              <a:t> </a:t>
-            </a:r>
-            <a:r>
-              <a:rPr lang="en-US" sz="2100" dirty="0" smtClean="0"/>
-              <a:t>user’s information</a:t>
+              <a:t>Edit all user’s information</a:t>
             </a:r>
           </a:p>
           <a:p>
@@ -7591,7 +7729,6 @@
               <a:rPr lang="en-US" dirty="0" smtClean="0"/>
               <a:t>Resources</a:t>
             </a:r>
-            <a:endParaRPr lang="en-US" dirty="0" smtClean="0"/>
           </a:p>
         </p:txBody>
       </p:sp>
@@ -7839,7 +7976,6 @@
               <a:rPr lang="en-US" sz="1800" dirty="0" smtClean="0"/>
               <a:t>Twitter</a:t>
             </a:r>
-            <a:endParaRPr lang="en-US" sz="1800" dirty="0" smtClean="0"/>
           </a:p>
           <a:p>
             <a:pPr lvl="1"/>
@@ -7847,7 +7983,6 @@
               <a:rPr lang="en-US" sz="2400" dirty="0" smtClean="0"/>
               <a:t>DB</a:t>
             </a:r>
-            <a:endParaRPr lang="en-US" sz="2400" dirty="0" smtClean="0"/>
           </a:p>
           <a:p>
             <a:pPr lvl="2"/>

</xml_diff>